<commit_message>
chỉnh màu của tầm nhìn và sương mù
</commit_message>
<xml_diff>
--- a/Presentation1.pptx
+++ b/Presentation1.pptx
@@ -259,7 +259,7 @@
           <a:p>
             <a:fld id="{B00AA527-56D6-439A-BAD3-F32F572F247A}" type="datetimeFigureOut">
               <a:rPr lang="en-US" smtClean="0"/>
-              <a:t>8/3/2020</a:t>
+              <a:t>8/9/2020</a:t>
             </a:fld>
             <a:endParaRPr lang="en-US"/>
           </a:p>
@@ -457,7 +457,7 @@
           <a:p>
             <a:fld id="{B00AA527-56D6-439A-BAD3-F32F572F247A}" type="datetimeFigureOut">
               <a:rPr lang="en-US" smtClean="0"/>
-              <a:t>8/3/2020</a:t>
+              <a:t>8/9/2020</a:t>
             </a:fld>
             <a:endParaRPr lang="en-US"/>
           </a:p>
@@ -665,7 +665,7 @@
           <a:p>
             <a:fld id="{B00AA527-56D6-439A-BAD3-F32F572F247A}" type="datetimeFigureOut">
               <a:rPr lang="en-US" smtClean="0"/>
-              <a:t>8/3/2020</a:t>
+              <a:t>8/9/2020</a:t>
             </a:fld>
             <a:endParaRPr lang="en-US"/>
           </a:p>
@@ -863,7 +863,7 @@
           <a:p>
             <a:fld id="{B00AA527-56D6-439A-BAD3-F32F572F247A}" type="datetimeFigureOut">
               <a:rPr lang="en-US" smtClean="0"/>
-              <a:t>8/3/2020</a:t>
+              <a:t>8/9/2020</a:t>
             </a:fld>
             <a:endParaRPr lang="en-US"/>
           </a:p>
@@ -1138,7 +1138,7 @@
           <a:p>
             <a:fld id="{B00AA527-56D6-439A-BAD3-F32F572F247A}" type="datetimeFigureOut">
               <a:rPr lang="en-US" smtClean="0"/>
-              <a:t>8/3/2020</a:t>
+              <a:t>8/9/2020</a:t>
             </a:fld>
             <a:endParaRPr lang="en-US"/>
           </a:p>
@@ -1403,7 +1403,7 @@
           <a:p>
             <a:fld id="{B00AA527-56D6-439A-BAD3-F32F572F247A}" type="datetimeFigureOut">
               <a:rPr lang="en-US" smtClean="0"/>
-              <a:t>8/3/2020</a:t>
+              <a:t>8/9/2020</a:t>
             </a:fld>
             <a:endParaRPr lang="en-US"/>
           </a:p>
@@ -1815,7 +1815,7 @@
           <a:p>
             <a:fld id="{B00AA527-56D6-439A-BAD3-F32F572F247A}" type="datetimeFigureOut">
               <a:rPr lang="en-US" smtClean="0"/>
-              <a:t>8/3/2020</a:t>
+              <a:t>8/9/2020</a:t>
             </a:fld>
             <a:endParaRPr lang="en-US"/>
           </a:p>
@@ -1956,7 +1956,7 @@
           <a:p>
             <a:fld id="{B00AA527-56D6-439A-BAD3-F32F572F247A}" type="datetimeFigureOut">
               <a:rPr lang="en-US" smtClean="0"/>
-              <a:t>8/3/2020</a:t>
+              <a:t>8/9/2020</a:t>
             </a:fld>
             <a:endParaRPr lang="en-US"/>
           </a:p>
@@ -2069,7 +2069,7 @@
           <a:p>
             <a:fld id="{B00AA527-56D6-439A-BAD3-F32F572F247A}" type="datetimeFigureOut">
               <a:rPr lang="en-US" smtClean="0"/>
-              <a:t>8/3/2020</a:t>
+              <a:t>8/9/2020</a:t>
             </a:fld>
             <a:endParaRPr lang="en-US"/>
           </a:p>
@@ -2380,7 +2380,7 @@
           <a:p>
             <a:fld id="{B00AA527-56D6-439A-BAD3-F32F572F247A}" type="datetimeFigureOut">
               <a:rPr lang="en-US" smtClean="0"/>
-              <a:t>8/3/2020</a:t>
+              <a:t>8/9/2020</a:t>
             </a:fld>
             <a:endParaRPr lang="en-US"/>
           </a:p>
@@ -2668,7 +2668,7 @@
           <a:p>
             <a:fld id="{B00AA527-56D6-439A-BAD3-F32F572F247A}" type="datetimeFigureOut">
               <a:rPr lang="en-US" smtClean="0"/>
-              <a:t>8/3/2020</a:t>
+              <a:t>8/9/2020</a:t>
             </a:fld>
             <a:endParaRPr lang="en-US"/>
           </a:p>
@@ -2909,7 +2909,7 @@
           <a:p>
             <a:fld id="{B00AA527-56D6-439A-BAD3-F32F572F247A}" type="datetimeFigureOut">
               <a:rPr lang="en-US" smtClean="0"/>
-              <a:t>8/3/2020</a:t>
+              <a:t>8/9/2020</a:t>
             </a:fld>
             <a:endParaRPr lang="en-US"/>
           </a:p>
@@ -3750,7 +3750,7 @@
           </a:prstGeom>
           <a:solidFill>
             <a:schemeClr val="bg2">
-              <a:lumMod val="50000"/>
+              <a:lumMod val="75000"/>
             </a:schemeClr>
           </a:solidFill>
           <a:effectLst>
@@ -3779,6 +3779,65 @@
           <a:p>
             <a:pPr algn="ctr"/>
             <a:endParaRPr lang="en-US"/>
+          </a:p>
+        </p:txBody>
+      </p:sp>
+      <p:sp>
+        <p:nvSpPr>
+          <p:cNvPr id="12" name="Rectangle 11">
+            <a:extLst>
+              <a:ext uri="{FF2B5EF4-FFF2-40B4-BE49-F238E27FC236}">
+                <a16:creationId xmlns:a16="http://schemas.microsoft.com/office/drawing/2014/main" id="{7FC1DB63-BAE7-4FF4-9BBA-8C9FDD6FDB4A}"/>
+              </a:ext>
+            </a:extLst>
+          </p:cNvPr>
+          <p:cNvSpPr/>
+          <p:nvPr/>
+        </p:nvSpPr>
+        <p:spPr>
+          <a:xfrm>
+            <a:off x="3139405" y="2743197"/>
+            <a:ext cx="383283" cy="363985"/>
+          </a:xfrm>
+          <a:prstGeom prst="rect">
+            <a:avLst/>
+          </a:prstGeom>
+          <a:solidFill>
+            <a:srgbClr val="7E7C3C"/>
+          </a:solidFill>
+          <a:effectLst>
+            <a:softEdge rad="12700"/>
+          </a:effectLst>
+        </p:spPr>
+        <p:style>
+          <a:lnRef idx="2">
+            <a:schemeClr val="dk1">
+              <a:shade val="50000"/>
+            </a:schemeClr>
+          </a:lnRef>
+          <a:fillRef idx="1">
+            <a:schemeClr val="dk1"/>
+          </a:fillRef>
+          <a:effectRef idx="0">
+            <a:schemeClr val="dk1"/>
+          </a:effectRef>
+          <a:fontRef idx="minor">
+            <a:schemeClr val="lt1"/>
+          </a:fontRef>
+        </p:style>
+        <p:txBody>
+          <a:bodyPr rtlCol="0" anchor="ctr"/>
+          <a:lstStyle/>
+          <a:p>
+            <a:pPr algn="ctr"/>
+            <a:endParaRPr lang="en-US">
+              <a:solidFill>
+                <a:schemeClr val="accent4">
+                  <a:lumMod val="40000"/>
+                  <a:lumOff val="60000"/>
+                </a:schemeClr>
+              </a:solidFill>
+            </a:endParaRPr>
           </a:p>
         </p:txBody>
       </p:sp>

</xml_diff>

<commit_message>
thu nhỏ các object trên màn hình
</commit_message>
<xml_diff>
--- a/Presentation1.pptx
+++ b/Presentation1.pptx
@@ -259,7 +259,7 @@
           <a:p>
             <a:fld id="{B00AA527-56D6-439A-BAD3-F32F572F247A}" type="datetimeFigureOut">
               <a:rPr lang="en-US" smtClean="0"/>
-              <a:t>8/9/2020</a:t>
+              <a:t>8/15/2020</a:t>
             </a:fld>
             <a:endParaRPr lang="en-US"/>
           </a:p>
@@ -457,7 +457,7 @@
           <a:p>
             <a:fld id="{B00AA527-56D6-439A-BAD3-F32F572F247A}" type="datetimeFigureOut">
               <a:rPr lang="en-US" smtClean="0"/>
-              <a:t>8/9/2020</a:t>
+              <a:t>8/15/2020</a:t>
             </a:fld>
             <a:endParaRPr lang="en-US"/>
           </a:p>
@@ -665,7 +665,7 @@
           <a:p>
             <a:fld id="{B00AA527-56D6-439A-BAD3-F32F572F247A}" type="datetimeFigureOut">
               <a:rPr lang="en-US" smtClean="0"/>
-              <a:t>8/9/2020</a:t>
+              <a:t>8/15/2020</a:t>
             </a:fld>
             <a:endParaRPr lang="en-US"/>
           </a:p>
@@ -863,7 +863,7 @@
           <a:p>
             <a:fld id="{B00AA527-56D6-439A-BAD3-F32F572F247A}" type="datetimeFigureOut">
               <a:rPr lang="en-US" smtClean="0"/>
-              <a:t>8/9/2020</a:t>
+              <a:t>8/15/2020</a:t>
             </a:fld>
             <a:endParaRPr lang="en-US"/>
           </a:p>
@@ -1138,7 +1138,7 @@
           <a:p>
             <a:fld id="{B00AA527-56D6-439A-BAD3-F32F572F247A}" type="datetimeFigureOut">
               <a:rPr lang="en-US" smtClean="0"/>
-              <a:t>8/9/2020</a:t>
+              <a:t>8/15/2020</a:t>
             </a:fld>
             <a:endParaRPr lang="en-US"/>
           </a:p>
@@ -1403,7 +1403,7 @@
           <a:p>
             <a:fld id="{B00AA527-56D6-439A-BAD3-F32F572F247A}" type="datetimeFigureOut">
               <a:rPr lang="en-US" smtClean="0"/>
-              <a:t>8/9/2020</a:t>
+              <a:t>8/15/2020</a:t>
             </a:fld>
             <a:endParaRPr lang="en-US"/>
           </a:p>
@@ -1815,7 +1815,7 @@
           <a:p>
             <a:fld id="{B00AA527-56D6-439A-BAD3-F32F572F247A}" type="datetimeFigureOut">
               <a:rPr lang="en-US" smtClean="0"/>
-              <a:t>8/9/2020</a:t>
+              <a:t>8/15/2020</a:t>
             </a:fld>
             <a:endParaRPr lang="en-US"/>
           </a:p>
@@ -1956,7 +1956,7 @@
           <a:p>
             <a:fld id="{B00AA527-56D6-439A-BAD3-F32F572F247A}" type="datetimeFigureOut">
               <a:rPr lang="en-US" smtClean="0"/>
-              <a:t>8/9/2020</a:t>
+              <a:t>8/15/2020</a:t>
             </a:fld>
             <a:endParaRPr lang="en-US"/>
           </a:p>
@@ -2069,7 +2069,7 @@
           <a:p>
             <a:fld id="{B00AA527-56D6-439A-BAD3-F32F572F247A}" type="datetimeFigureOut">
               <a:rPr lang="en-US" smtClean="0"/>
-              <a:t>8/9/2020</a:t>
+              <a:t>8/15/2020</a:t>
             </a:fld>
             <a:endParaRPr lang="en-US"/>
           </a:p>
@@ -2380,7 +2380,7 @@
           <a:p>
             <a:fld id="{B00AA527-56D6-439A-BAD3-F32F572F247A}" type="datetimeFigureOut">
               <a:rPr lang="en-US" smtClean="0"/>
-              <a:t>8/9/2020</a:t>
+              <a:t>8/15/2020</a:t>
             </a:fld>
             <a:endParaRPr lang="en-US"/>
           </a:p>
@@ -2668,7 +2668,7 @@
           <a:p>
             <a:fld id="{B00AA527-56D6-439A-BAD3-F32F572F247A}" type="datetimeFigureOut">
               <a:rPr lang="en-US" smtClean="0"/>
-              <a:t>8/9/2020</a:t>
+              <a:t>8/15/2020</a:t>
             </a:fld>
             <a:endParaRPr lang="en-US"/>
           </a:p>
@@ -2909,7 +2909,7 @@
           <a:p>
             <a:fld id="{B00AA527-56D6-439A-BAD3-F32F572F247A}" type="datetimeFigureOut">
               <a:rPr lang="en-US" smtClean="0"/>
-              <a:t>8/9/2020</a:t>
+              <a:t>8/15/2020</a:t>
             </a:fld>
             <a:endParaRPr lang="en-US"/>
           </a:p>
@@ -3353,8 +3353,8 @@
         </p:blipFill>
         <p:spPr>
           <a:xfrm>
-            <a:off x="5433134" y="2743199"/>
-            <a:ext cx="452761" cy="479395"/>
+            <a:off x="4566711" y="2743199"/>
+            <a:ext cx="233169" cy="246886"/>
           </a:xfrm>
           <a:prstGeom prst="rect">
             <a:avLst/>
@@ -3395,8 +3395,8 @@
         </p:blipFill>
         <p:spPr>
           <a:xfrm rot="10800000">
-            <a:off x="4691362" y="2743199"/>
-            <a:ext cx="508077" cy="479395"/>
+            <a:off x="4077181" y="2743197"/>
+            <a:ext cx="261659" cy="246887"/>
           </a:xfrm>
           <a:prstGeom prst="rect">
             <a:avLst/>
@@ -3430,8 +3430,8 @@
         </p:blipFill>
         <p:spPr bwMode="auto">
           <a:xfrm>
-            <a:off x="4691362" y="3547390"/>
-            <a:ext cx="596653" cy="562971"/>
+            <a:off x="4691362" y="3547391"/>
+            <a:ext cx="329497" cy="310896"/>
           </a:xfrm>
           <a:prstGeom prst="rect">
             <a:avLst/>
@@ -3481,8 +3481,8 @@
         </p:blipFill>
         <p:spPr>
           <a:xfrm>
-            <a:off x="6177149" y="2743199"/>
-            <a:ext cx="452761" cy="479395"/>
+            <a:off x="5064881" y="2743198"/>
+            <a:ext cx="233169" cy="246886"/>
           </a:xfrm>
           <a:prstGeom prst="rect">
             <a:avLst/>
@@ -3522,8 +3522,8 @@
         </p:blipFill>
         <p:spPr>
           <a:xfrm>
-            <a:off x="6921164" y="2743199"/>
-            <a:ext cx="482886" cy="493736"/>
+            <a:off x="5567489" y="2743199"/>
+            <a:ext cx="241460" cy="246885"/>
           </a:xfrm>
           <a:prstGeom prst="rect">
             <a:avLst/>
@@ -3563,8 +3563,8 @@
         </p:blipFill>
         <p:spPr>
           <a:xfrm>
-            <a:off x="7695304" y="2743198"/>
-            <a:ext cx="453622" cy="479396"/>
+            <a:off x="6048892" y="2743199"/>
+            <a:ext cx="233612" cy="246885"/>
           </a:xfrm>
           <a:prstGeom prst="rect">
             <a:avLst/>
@@ -3600,8 +3600,8 @@
         </p:blipFill>
         <p:spPr bwMode="auto">
           <a:xfrm>
-            <a:off x="8396101" y="2743198"/>
-            <a:ext cx="479396" cy="479396"/>
+            <a:off x="6398037" y="2743198"/>
+            <a:ext cx="310720" cy="310720"/>
           </a:xfrm>
           <a:prstGeom prst="rect">
             <a:avLst/>
@@ -3654,8 +3654,8 @@
         </p:blipFill>
         <p:spPr bwMode="auto">
           <a:xfrm>
-            <a:off x="5659514" y="3547389"/>
-            <a:ext cx="596653" cy="562971"/>
+            <a:off x="5659515" y="3547390"/>
+            <a:ext cx="329497" cy="310896"/>
           </a:xfrm>
           <a:prstGeom prst="rect">
             <a:avLst/>
@@ -3710,8 +3710,8 @@
         </p:blipFill>
         <p:spPr bwMode="auto">
           <a:xfrm>
-            <a:off x="8973761" y="2743198"/>
-            <a:ext cx="479396" cy="479396"/>
+            <a:off x="6708757" y="2743197"/>
+            <a:ext cx="310720" cy="310720"/>
           </a:xfrm>
           <a:prstGeom prst="rect">
             <a:avLst/>
@@ -3742,8 +3742,8 @@
         </p:nvSpPr>
         <p:spPr>
           <a:xfrm>
-            <a:off x="3886875" y="2743198"/>
-            <a:ext cx="383283" cy="363985"/>
+            <a:off x="3656214" y="2743198"/>
+            <a:ext cx="201168" cy="201168"/>
           </a:xfrm>
           <a:prstGeom prst="rect">
             <a:avLst/>
@@ -3796,8 +3796,8 @@
         </p:nvSpPr>
         <p:spPr>
           <a:xfrm>
-            <a:off x="3139405" y="2743197"/>
-            <a:ext cx="383283" cy="363985"/>
+            <a:off x="3139404" y="2743197"/>
+            <a:ext cx="201168" cy="201168"/>
           </a:xfrm>
           <a:prstGeom prst="rect">
             <a:avLst/>
@@ -3841,6 +3841,132 @@
           </a:p>
         </p:txBody>
       </p:sp>
+      <p:pic>
+        <p:nvPicPr>
+          <p:cNvPr id="14" name="Picture 13">
+            <a:extLst>
+              <a:ext uri="{FF2B5EF4-FFF2-40B4-BE49-F238E27FC236}">
+                <a16:creationId xmlns:a16="http://schemas.microsoft.com/office/drawing/2014/main" id="{4BE84745-9F40-4036-A0C6-EA20C665DC87}"/>
+              </a:ext>
+            </a:extLst>
+          </p:cNvPr>
+          <p:cNvPicPr>
+            <a:picLocks noChangeAspect="1"/>
+          </p:cNvPicPr>
+          <p:nvPr/>
+        </p:nvPicPr>
+        <p:blipFill>
+          <a:blip r:embed="rId3">
+            <a:extLst>
+              <a:ext uri="{BEBA8EAE-BF5A-486C-A8C5-ECC9F3942E4B}">
+                <a14:imgProps xmlns:a14="http://schemas.microsoft.com/office/drawing/2010/main">
+                  <a14:imgLayer r:embed="rId4">
+                    <a14:imgEffect>
+                      <a14:backgroundRemoval t="4274" b="97436" l="0" r="93548"/>
+                    </a14:imgEffect>
+                  </a14:imgLayer>
+                </a14:imgProps>
+              </a:ext>
+            </a:extLst>
+          </a:blip>
+          <a:stretch>
+            <a:fillRect/>
+          </a:stretch>
+        </p:blipFill>
+        <p:spPr>
+          <a:xfrm rot="5400000">
+            <a:off x="4063829" y="2309091"/>
+            <a:ext cx="261660" cy="246888"/>
+          </a:xfrm>
+          <a:prstGeom prst="rect">
+            <a:avLst/>
+          </a:prstGeom>
+        </p:spPr>
+      </p:pic>
+      <p:pic>
+        <p:nvPicPr>
+          <p:cNvPr id="16" name="Picture 15">
+            <a:extLst>
+              <a:ext uri="{FF2B5EF4-FFF2-40B4-BE49-F238E27FC236}">
+                <a16:creationId xmlns:a16="http://schemas.microsoft.com/office/drawing/2014/main" id="{969A6F16-0499-40F5-AFEF-A8EEBA084172}"/>
+              </a:ext>
+            </a:extLst>
+          </p:cNvPr>
+          <p:cNvPicPr>
+            <a:picLocks noChangeAspect="1"/>
+          </p:cNvPicPr>
+          <p:nvPr/>
+        </p:nvPicPr>
+        <p:blipFill>
+          <a:blip r:embed="rId3">
+            <a:extLst>
+              <a:ext uri="{BEBA8EAE-BF5A-486C-A8C5-ECC9F3942E4B}">
+                <a14:imgProps xmlns:a14="http://schemas.microsoft.com/office/drawing/2010/main">
+                  <a14:imgLayer r:embed="rId4">
+                    <a14:imgEffect>
+                      <a14:backgroundRemoval t="4274" b="97436" l="0" r="93548"/>
+                    </a14:imgEffect>
+                  </a14:imgLayer>
+                </a14:imgProps>
+              </a:ext>
+            </a:extLst>
+          </a:blip>
+          <a:stretch>
+            <a:fillRect/>
+          </a:stretch>
+        </p:blipFill>
+        <p:spPr>
+          <a:xfrm>
+            <a:off x="4077182" y="1831760"/>
+            <a:ext cx="261660" cy="246888"/>
+          </a:xfrm>
+          <a:prstGeom prst="rect">
+            <a:avLst/>
+          </a:prstGeom>
+        </p:spPr>
+      </p:pic>
+      <p:pic>
+        <p:nvPicPr>
+          <p:cNvPr id="17" name="Picture 16">
+            <a:extLst>
+              <a:ext uri="{FF2B5EF4-FFF2-40B4-BE49-F238E27FC236}">
+                <a16:creationId xmlns:a16="http://schemas.microsoft.com/office/drawing/2014/main" id="{A1B83D9E-D52E-4F6B-9509-F43BC70790CE}"/>
+              </a:ext>
+            </a:extLst>
+          </p:cNvPr>
+          <p:cNvPicPr>
+            <a:picLocks noChangeAspect="1"/>
+          </p:cNvPicPr>
+          <p:nvPr/>
+        </p:nvPicPr>
+        <p:blipFill>
+          <a:blip r:embed="rId3">
+            <a:extLst>
+              <a:ext uri="{BEBA8EAE-BF5A-486C-A8C5-ECC9F3942E4B}">
+                <a14:imgProps xmlns:a14="http://schemas.microsoft.com/office/drawing/2010/main">
+                  <a14:imgLayer r:embed="rId4">
+                    <a14:imgEffect>
+                      <a14:backgroundRemoval t="4274" b="97436" l="0" r="93548"/>
+                    </a14:imgEffect>
+                  </a14:imgLayer>
+                </a14:imgProps>
+              </a:ext>
+            </a:extLst>
+          </a:blip>
+          <a:stretch>
+            <a:fillRect/>
+          </a:stretch>
+        </p:blipFill>
+        <p:spPr>
+          <a:xfrm rot="16200000">
+            <a:off x="4077762" y="1346497"/>
+            <a:ext cx="261660" cy="246888"/>
+          </a:xfrm>
+          <a:prstGeom prst="rect">
+            <a:avLst/>
+          </a:prstGeom>
+        </p:spPr>
+      </p:pic>
     </p:spTree>
     <p:extLst>
       <p:ext uri="{BB962C8B-B14F-4D97-AF65-F5344CB8AC3E}">

</xml_diff>